<commit_message>
updated after lecture 4
</commit_message>
<xml_diff>
--- a/PowerBIQuickStart.E04/Power BI Quick Start2.E04.pptx
+++ b/PowerBIQuickStart.E04/Power BI Quick Start2.E04.pptx
@@ -20427,7 +20427,7 @@
           </a:ln>
           <a:extLst>
             <a:ext uri="{C572A759-6A51-4108-AA02-DFA0A04FC94B}">
-              <ma14:wrappingTextBoxFlag xmlns="" xmlns:ma14="http://schemas.microsoft.com/office/mac/drawingml/2011/main" val="1"/>
+              <ma14:wrappingTextBoxFlag xmlns:ma14="http://schemas.microsoft.com/office/mac/drawingml/2011/main" xmlns="" val="1"/>
             </a:ext>
           </a:extLst>
         </p:spPr>
@@ -25181,13 +25181,13 @@
                 <a:effectLst/>
                 <a:latin typeface="+mn-lt"/>
               </a:rPr>
-              <a:t>Power BI Quick Start #4 </a:t>
+              <a:t>Power BI Quick Start #2 </a:t>
             </a:r>
             <a:r>
               <a:rPr lang="en-US" dirty="0">
                 <a:latin typeface="+mn-lt"/>
               </a:rPr>
-              <a:t>E01</a:t>
+              <a:t>E04</a:t>
             </a:r>
           </a:p>
         </p:txBody>
@@ -29357,18 +29357,18 @@
 </file>
 
 <file path=customXml/item2.xml><?xml version="1.0" encoding="utf-8"?>
-<p:properties xmlns:p="http://schemas.microsoft.com/office/2006/metadata/properties" xmlns:xsi="http://www.w3.org/2001/XMLSchema-instance" xmlns:pc="http://schemas.microsoft.com/office/infopath/2007/PartnerControls">
-  <documentManagement/>
-</p:properties>
-</file>
-
-<file path=customXml/item3.xml><?xml version="1.0" encoding="utf-8"?>
 <?mso-contentType ?>
 <FormTemplates xmlns="http://schemas.microsoft.com/sharepoint/v3/contenttype/forms">
   <Display>DocumentLibraryForm</Display>
   <Edit>DocumentLibraryForm</Edit>
   <New>DocumentLibraryForm</New>
 </FormTemplates>
+</file>
+
+<file path=customXml/item3.xml><?xml version="1.0" encoding="utf-8"?>
+<p:properties xmlns:p="http://schemas.microsoft.com/office/2006/metadata/properties" xmlns:xsi="http://www.w3.org/2001/XMLSchema-instance" xmlns:pc="http://schemas.microsoft.com/office/infopath/2007/PartnerControls">
+  <documentManagement/>
+</p:properties>
 </file>
 
 <file path=customXml/itemProps1.xml><?xml version="1.0" encoding="utf-8"?>
@@ -29391,6 +29391,14 @@
 </file>
 
 <file path=customXml/itemProps2.xml><?xml version="1.0" encoding="utf-8"?>
+<ds:datastoreItem xmlns:ds="http://schemas.openxmlformats.org/officeDocument/2006/customXml" ds:itemID="{14883F0F-DE57-4ECA-B9BB-F22E8C5B5D82}">
+  <ds:schemaRefs>
+    <ds:schemaRef ds:uri="http://schemas.microsoft.com/sharepoint/v3/contenttype/forms"/>
+  </ds:schemaRefs>
+</ds:datastoreItem>
+</file>
+
+<file path=customXml/itemProps3.xml><?xml version="1.0" encoding="utf-8"?>
 <ds:datastoreItem xmlns:ds="http://schemas.openxmlformats.org/officeDocument/2006/customXml" ds:itemID="{D5E3C081-4081-47AD-A9A6-9F18F525DA1D}">
   <ds:schemaRefs>
     <ds:schemaRef ds:uri="http://purl.org/dc/terms/"/>
@@ -29405,12 +29413,4 @@
     <ds:schemaRef ds:uri="http://schemas.microsoft.com/office/2006/metadata/properties"/>
   </ds:schemaRefs>
 </ds:datastoreItem>
-</file>
-
-<file path=customXml/itemProps3.xml><?xml version="1.0" encoding="utf-8"?>
-<ds:datastoreItem xmlns:ds="http://schemas.openxmlformats.org/officeDocument/2006/customXml" ds:itemID="{14883F0F-DE57-4ECA-B9BB-F22E8C5B5D82}">
-  <ds:schemaRefs>
-    <ds:schemaRef ds:uri="http://schemas.microsoft.com/sharepoint/v3/contenttype/forms"/>
-  </ds:schemaRefs>
-</ds:datastoreItem>
 </file>
</xml_diff>